<commit_message>
Adding in more templates
Sector Impact
Three rows
Heading Text
</commit_message>
<xml_diff>
--- a/samples/pptx/sample.pptx
+++ b/samples/pptx/sample.pptx
@@ -11,13 +11,6 @@
     <p:sldId id="259" r:id="rId9"/>
     <p:sldId id="260" r:id="rId10"/>
     <p:sldId id="261" r:id="rId11"/>
-    <p:sldId id="262" r:id="rId12"/>
-    <p:sldId id="263" r:id="rId13"/>
-    <p:sldId id="264" r:id="rId14"/>
-    <p:sldId id="265" r:id="rId15"/>
-    <p:sldId id="266" r:id="rId16"/>
-    <p:sldId id="267" r:id="rId17"/>
-    <p:sldId id="268" r:id="rId18"/>
   </p:sldIdLst>
   <p:sldSz cx="9144000" cy="6858000" type="screen4x3"/>
   <p:notesSz cx="6858000" cy="9144000"/>
@@ -16831,7 +16824,7 @@
           <a:p>
             <a:r>
               <a:rPr dirty="0" lang="en-US" smtClean="0"/>
-              <a:t>Bicycle Of the Mind</a:t>
+              <a:t>Test Presentation</a:t>
             </a:r>
             <a:endParaRPr dirty="0" lang="en-US"/>
           </a:p>
@@ -16854,7 +16847,7 @@
           <a:p>
             <a:r>
               <a:rPr lang="en-US" smtClean="0"/>
-              <a:t>created by Steve Jobs</a:t>
+              <a:t>created automagically</a:t>
             </a:r>
             <a:endParaRPr lang="en-US"/>
           </a:p>
@@ -16864,395 +16857,6 @@
     <p:extLst>
       <p:ext uri="{BB962C8B-B14F-4D97-AF65-F5344CB8AC3E}">
         <p14:creationId xmlns:p14="http://schemas.microsoft.com/office/powerpoint/2010/main" val="1633108117"/>
-      </p:ext>
-    </p:extLst>
-  </p:cSld>
-  <p:clrMapOvr>
-    <a:masterClrMapping/>
-  </p:clrMapOvr>
-</p:sld>
-</file>
-
-<file path=ppt/slides/slide10.xml><?xml version="1.0" encoding="utf-8"?>
-<p:sld xmlns:a="http://schemas.openxmlformats.org/drawingml/2006/main" xmlns:r="http://schemas.openxmlformats.org/officeDocument/2006/relationships" xmlns:p="http://schemas.openxmlformats.org/presentationml/2006/main">
-  <p:cSld>
-    <p:spTree>
-      <p:nvGrpSpPr>
-        <p:cNvPr id="1" name=""/>
-        <p:cNvGrpSpPr/>
-        <p:nvPr/>
-      </p:nvGrpSpPr>
-      <p:grpSpPr>
-        <a:xfrm>
-          <a:off x="0" y="0"/>
-          <a:ext cx="0" cy="0"/>
-          <a:chOff x="0" y="0"/>
-          <a:chExt cx="0" cy="0"/>
-        </a:xfrm>
-      </p:grpSpPr>
-      <p:sp>
-        <p:nvSpPr>
-          <p:cNvPr id="2" name="Title 1"/>
-          <p:cNvSpPr>
-            <a:spLocks noGrp="1"/>
-          </p:cNvSpPr>
-          <p:nvPr>
-            <p:ph type="title"/>
-          </p:nvPr>
-        </p:nvSpPr>
-        <p:spPr/>
-        <p:txBody>
-          <a:bodyPr/>
-          <a:lstStyle/>
-          <a:p>
-            <a:r>
-              <a:rPr lang="en-US" dirty="0" smtClean="0"/>
-              <a:t>Pic Desc</a:t>
-            </a:r>
-            <a:endParaRPr lang="en-US" dirty="0"/>
-          </a:p>
-        </p:txBody>
-      </p:sp>
-      <p:pic>
-        <p:nvPicPr>
-          <p:cNvPr id="5" name="Picture Placeholder 4"/>
-          <p:cNvPicPr>
-            <a:picLocks noGrp="1" noChangeAspect="1"/>
-          </p:cNvPicPr>
-          <p:nvPr>
-            <p:ph type="pic" idx="1"/>
-          </p:nvPr>
-        </p:nvPicPr>
-        <p:blipFill>
-          <a:blip r:embed="rId2">
-            <a:extLst>
-              <a:ext uri="{28A0092B-C50C-407E-A947-70E740481C1C}">
-                <a14:useLocalDpi xmlns:a14="http://schemas.microsoft.com/office/drawing/2010/main" val="0"/>
-              </a:ext>
-            </a:extLst>
-          </a:blip>
-          <a:stretch>
-            <a:fillRect/>
-          </a:stretch>
-        </p:blipFill>
-        <p:spPr>
-          <a:xfrm>
-            <a:off x="2794000" y="762000"/>
-            <a:ext cx="3556000" cy="2667000"/>
-          </a:xfrm>
-          <a:prstGeom prst="rect">
-            <a:avLst/>
-          </a:prstGeom>
-        </p:spPr>
-      </p:pic>
-      <p:sp>
-        <p:nvSpPr>
-          <p:cNvPr id="4" name="Text Placeholder 4"/>
-          <p:cNvSpPr>
-            <a:spLocks noGrp="1"/>
-          </p:cNvSpPr>
-          <p:nvPr>
-            <p:ph type="body" sz="half" idx="2"/>
-          </p:nvPr>
-        </p:nvSpPr>
-        <p:spPr/>
-        <p:txBody>
-          <a:bodyPr/>
-          <a:lstStyle/>
-          <a:p>
-            <a:r>
-              <a:rPr lang="en-US" dirty="0" smtClean="0"/>
-              <a:t>Here is a string</a:t>
-            </a:r>
-          </a:p>
-          <a:p>
-            <a:r>
-              <a:rPr lang="en-US" dirty="0" smtClean="0"/>
-              <a:t>here is another</a:t>
-            </a:r>
-            <a:endParaRPr lang="en-US"/>
-          </a:p>
-        </p:txBody>
-      </p:sp>
-    </p:spTree>
-    <p:extLst>
-      <p:ext uri="{BB962C8B-B14F-4D97-AF65-F5344CB8AC3E}">
-        <p14:creationId xmlns:p14="http://schemas.microsoft.com/office/powerpoint/2010/main" val="1435759726"/>
-      </p:ext>
-    </p:extLst>
-  </p:cSld>
-  <p:clrMapOvr>
-    <a:masterClrMapping/>
-  </p:clrMapOvr>
-</p:sld>
-</file>
-
-<file path=ppt/slides/slide11.xml><?xml version="1.0" encoding="utf-8"?>
-<p:sld xmlns:a="http://schemas.openxmlformats.org/drawingml/2006/main" xmlns:r="http://schemas.openxmlformats.org/officeDocument/2006/relationships" xmlns:p="http://schemas.openxmlformats.org/presentationml/2006/main">
-  <p:cSld>
-    <p:spTree>
-      <p:nvGrpSpPr>
-        <p:cNvPr id="1" name=""/>
-        <p:cNvGrpSpPr/>
-        <p:nvPr/>
-      </p:nvGrpSpPr>
-      <p:grpSpPr>
-        <a:xfrm>
-          <a:off x="0" y="0"/>
-          <a:ext cx="0" cy="0"/>
-          <a:chOff x="0" y="0"/>
-          <a:chExt cx="0" cy="0"/>
-        </a:xfrm>
-      </p:grpSpPr>
-      <p:sp>
-        <p:nvSpPr>
-          <p:cNvPr id="2" name="Title 1"/>
-          <p:cNvSpPr>
-            <a:spLocks noGrp="1"/>
-          </p:cNvSpPr>
-          <p:nvPr>
-            <p:ph type="title"/>
-          </p:nvPr>
-        </p:nvSpPr>
-        <p:spPr/>
-        <p:txBody>
-          <a:bodyPr/>
-          <a:lstStyle/>
-          <a:p>
-            <a:r>
-              <a:rPr lang="en-US" dirty="0" smtClean="0"/>
-              <a:t>JPG Logo</a:t>
-            </a:r>
-            <a:endParaRPr lang="en-US" dirty="0"/>
-          </a:p>
-        </p:txBody>
-      </p:sp>
-      <p:pic>
-        <p:nvPicPr>
-          <p:cNvPr id="5" name="Picture Placeholder 4"/>
-          <p:cNvPicPr>
-            <a:picLocks noGrp="1" noChangeAspect="1"/>
-          </p:cNvPicPr>
-          <p:nvPr>
-            <p:ph type="pic" idx="1"/>
-          </p:nvPr>
-        </p:nvPicPr>
-        <p:blipFill>
-          <a:blip r:embed="rId2">
-            <a:extLst>
-              <a:ext uri="{28A0092B-C50C-407E-A947-70E740481C1C}">
-                <a14:useLocalDpi xmlns:a14="http://schemas.microsoft.com/office/drawing/2010/main" val="0"/>
-              </a:ext>
-            </a:extLst>
-          </a:blip>
-          <a:stretch>
-            <a:fillRect/>
-          </a:stretch>
-        </p:blipFill>
-        <p:spPr>
-          <a:xfrm>
-            <a:off x="2159000" y="762000"/>
-            <a:ext cx="4826000" cy="1689100"/>
-          </a:xfrm>
-          <a:prstGeom prst="rect">
-            <a:avLst/>
-          </a:prstGeom>
-        </p:spPr>
-      </p:pic>
-      <p:sp>
-        <p:nvSpPr>
-          <p:cNvPr id="4" name="Text Placeholder 4"/>
-          <p:cNvSpPr>
-            <a:spLocks noGrp="1"/>
-          </p:cNvSpPr>
-          <p:nvPr>
-            <p:ph type="body" sz="half" idx="2"/>
-          </p:nvPr>
-        </p:nvSpPr>
-        <p:spPr/>
-        <p:txBody>
-          <a:bodyPr/>
-          <a:lstStyle/>
-          <a:p>
-            <a:r>
-              <a:rPr lang="en-US" dirty="0" smtClean="0"/>
-              <a:t>descriptions</a:t>
-            </a:r>
-            <a:endParaRPr lang="en-US"/>
-          </a:p>
-        </p:txBody>
-      </p:sp>
-    </p:spTree>
-    <p:extLst>
-      <p:ext uri="{BB962C8B-B14F-4D97-AF65-F5344CB8AC3E}">
-        <p14:creationId xmlns:p14="http://schemas.microsoft.com/office/powerpoint/2010/main" val="1435759726"/>
-      </p:ext>
-    </p:extLst>
-  </p:cSld>
-  <p:clrMapOvr>
-    <a:masterClrMapping/>
-  </p:clrMapOvr>
-</p:sld>
-</file>
-
-<file path=ppt/slides/slide12.xml><?xml version="1.0" encoding="utf-8"?>
-<p:sld xmlns:a="http://schemas.openxmlformats.org/drawingml/2006/main" xmlns:p="http://schemas.openxmlformats.org/presentationml/2006/main" xmlns:r="http://schemas.openxmlformats.org/officeDocument/2006/relationships">
-  <p:cSld>
-    <p:spTree>
-      <p:nvGrpSpPr>
-        <p:cNvPr id="1" name=""/>
-        <p:cNvGrpSpPr/>
-        <p:nvPr/>
-      </p:nvGrpSpPr>
-      <p:grpSpPr>
-        <a:xfrm>
-          <a:off x="0" y="0"/>
-          <a:ext cx="0" cy="0"/>
-          <a:chOff x="0" y="0"/>
-          <a:chExt cx="0" cy="0"/>
-        </a:xfrm>
-      </p:grpSpPr>
-      <p:sp>
-        <p:nvSpPr>
-          <p:cNvPr id="2" name="Title 1"/>
-          <p:cNvSpPr>
-            <a:spLocks noGrp="1"/>
-          </p:cNvSpPr>
-          <p:nvPr>
-            <p:ph type="title"/>
-          </p:nvPr>
-        </p:nvSpPr>
-        <p:spPr/>
-        <p:txBody>
-          <a:bodyPr/>
-          <a:lstStyle/>
-          <a:p>
-            <a:r>
-              <a:rPr dirty="0" lang="en-US" smtClean="0"/>
-              <a:t>GIF Logo</a:t>
-            </a:r>
-            <a:endParaRPr dirty="0" lang="en-US"/>
-          </a:p>
-        </p:txBody>
-      </p:sp>
-      <p:pic>
-        <p:nvPicPr>
-          <p:cNvPr id="4" name="Content Placeholder 3"/>
-          <p:cNvPicPr>
-            <a:picLocks noChangeAspect="1" noGrp="1"/>
-          </p:cNvPicPr>
-          <p:nvPr>
-            <p:ph idx="1"/>
-          </p:nvPr>
-        </p:nvPicPr>
-        <p:blipFill>
-          <a:blip r:embed="rId2">
-            <a:extLst>
-              <a:ext uri="{28A0092B-C50C-407E-A947-70E740481C1C}">
-                <a14:useLocalDpi xmlns:a14="http://schemas.microsoft.com/office/drawing/2010/main" val="0"/>
-              </a:ext>
-            </a:extLst>
-          </a:blip>
-          <a:stretch>
-            <a:fillRect/>
-          </a:stretch>
-        </p:blipFill>
-        <p:spPr>
-          <a:xfrm>
-            <a:off x="124200" y="3356451"/>
-            <a:ext cx="2895600" cy="1013460"/>
-          </a:xfrm>
-          <a:prstGeom prst="rect">
-            <a:avLst/>
-          </a:prstGeom>
-        </p:spPr>
-      </p:pic>
-    </p:spTree>
-    <p:extLst>
-      <p:ext uri="{BB962C8B-B14F-4D97-AF65-F5344CB8AC3E}">
-        <p14:creationId xmlns:p14="http://schemas.microsoft.com/office/powerpoint/2010/main" val="1474098577"/>
-      </p:ext>
-    </p:extLst>
-  </p:cSld>
-  <p:clrMapOvr>
-    <a:masterClrMapping/>
-  </p:clrMapOvr>
-</p:sld>
-</file>
-
-<file path=ppt/slides/slide13.xml><?xml version="1.0" encoding="utf-8"?>
-<p:sld xmlns:a="http://schemas.openxmlformats.org/drawingml/2006/main" xmlns:p="http://schemas.openxmlformats.org/presentationml/2006/main" xmlns:r="http://schemas.openxmlformats.org/officeDocument/2006/relationships">
-  <p:cSld>
-    <p:spTree>
-      <p:nvGrpSpPr>
-        <p:cNvPr id="1" name=""/>
-        <p:cNvGrpSpPr/>
-        <p:nvPr/>
-      </p:nvGrpSpPr>
-      <p:grpSpPr>
-        <a:xfrm>
-          <a:off x="0" y="0"/>
-          <a:ext cx="0" cy="0"/>
-          <a:chOff x="0" y="0"/>
-          <a:chExt cx="0" cy="0"/>
-        </a:xfrm>
-      </p:grpSpPr>
-      <p:sp>
-        <p:nvSpPr>
-          <p:cNvPr id="2" name="Title 1"/>
-          <p:cNvSpPr>
-            <a:spLocks noGrp="1"/>
-          </p:cNvSpPr>
-          <p:nvPr>
-            <p:ph type="title"/>
-          </p:nvPr>
-        </p:nvSpPr>
-        <p:spPr/>
-        <p:txBody>
-          <a:bodyPr/>
-          <a:lstStyle/>
-          <a:p>
-            <a:r>
-              <a:rPr dirty="0" lang="en-US" smtClean="0"/>
-              <a:t>Why Android?</a:t>
-            </a:r>
-            <a:endParaRPr dirty="0" lang="en-US"/>
-          </a:p>
-        </p:txBody>
-      </p:sp>
-      <p:sp>
-        <p:nvSpPr>
-          <p:cNvPr id="3" name="Content Placeholder 2"/>
-          <p:cNvSpPr>
-            <a:spLocks noGrp="1"/>
-          </p:cNvSpPr>
-          <p:nvPr>
-            <p:ph idx="1"/>
-          </p:nvPr>
-        </p:nvSpPr>
-        <p:spPr/>
-        <p:txBody>
-          <a:bodyPr/>
-          <a:lstStyle/>
-          <a:p>
-            <a:r>
-              <a:rPr dirty="0" lang="en-US" smtClean="0"/>
-              <a:t>Its great!</a:t>
-            </a:r>
-          </a:p>
-          <a:p>
-            <a:r>
-              <a:rPr dirty="0" lang="en-US" smtClean="0"/>
-              <a:t>Its sweet!</a:t>
-            </a:r>
-            <a:endParaRPr lang="en-US"/>
-          </a:p>
-        </p:txBody>
-      </p:sp>
-    </p:spTree>
-    <p:extLst>
-      <p:ext uri="{BB962C8B-B14F-4D97-AF65-F5344CB8AC3E}">
-        <p14:creationId xmlns:p14="http://schemas.microsoft.com/office/powerpoint/2010/main" val="1231192379"/>
       </p:ext>
     </p:extLst>
   </p:cSld>
@@ -19705,16 +19309,37 @@
           <a:bodyPr/>
           <a:lstStyle/>
           <a:p>
+            <a:pPr marL="0" indent="0">
+              <a:spcAft>
+                <a:spcPts val="600"/>
+              </a:spcAft>
+              <a:buNone/>
+            </a:pPr>
             <a:r>
+              <a:rPr lang="en-US" sz="1600" b="0" noProof="0" dirty="0" smtClean="0"/>
               <a:t xml:space="preserve">Test paragraph 1</a:t>
             </a:r>
           </a:p>
           <a:p>
+            <a:pPr marL="0" indent="0">
+              <a:spcAft>
+                <a:spcPts val="600"/>
+              </a:spcAft>
+              <a:buNone/>
+            </a:pPr>
             <a:r>
+              <a:rPr lang="en-US" sz="1600" b="0" noProof="0" dirty="0" smtClean="0"/>
               <a:t xml:space="preserve">Test paragraph 2</a:t>
             </a:r>
           </a:p>
-          <a:p/>
+          <a:p>
+            <a:pPr marL="0" indent="0">
+              <a:spcAft>
+                <a:spcPts val="600"/>
+              </a:spcAft>
+              <a:buNone/>
+            </a:pPr>
+          </a:p>
           <a:p>
             <a:pPr>
               <a:pStyle a:val="ListParagraph"/>
@@ -19724,6 +19349,7 @@
               </a:numPr>
             </a:pPr>
             <a:r>
+              <a:rPr lang="en-US" sz="1600" b="0" noProof="0" dirty="0" smtClean="0"/>
               <a:t xml:space="preserve">list 1</a:t>
             </a:r>
           </a:p>
@@ -19736,20 +19362,30 @@
               </a:numPr>
             </a:pPr>
             <a:r>
+              <a:rPr lang="en-US" sz="1600" b="0" noProof="0" dirty="0" smtClean="0"/>
               <a:t xml:space="preserve">List 2</a:t>
             </a:r>
           </a:p>
           <a:p>
+            <a:pPr marL="0" indent="0">
+              <a:spcAft>
+                <a:spcPts val="600"/>
+              </a:spcAft>
+              <a:buNone/>
+            </a:pPr>
             <a:r>
+              <a:rPr lang="en-US" sz="1600" b="0" noProof="0" dirty="0" smtClean="0"/>
               <a:t xml:space="preserve">A </a:t>
             </a:r>
             <a:r>
               <a:rPr>
                 <a:b/>
               </a:rPr>
+              <a:rPr lang="en-US" sz="1600" b="0" noProof="0" dirty="0" smtClean="0"/>
               <a:t xml:space="preserve">bold</a:t>
             </a:r>
             <a:r>
+              <a:rPr lang="en-US" sz="1600" b="0" noProof="0" dirty="0" smtClean="0"/>
               <a:t xml:space="preserve"> word</a:t>
             </a:r>
           </a:p>
@@ -19818,255 +19454,6 @@
 </file>
 
 <file path=ppt/slides/slide5.xml><?xml version="1.0" encoding="utf-8"?>
-<p:sld xmlns:a="http://schemas.openxmlformats.org/drawingml/2006/main" xmlns:p="http://schemas.openxmlformats.org/presentationml/2006/main" xmlns:r="http://schemas.openxmlformats.org/officeDocument/2006/relationships">
-  <p:cSld>
-    <p:spTree>
-      <p:nvGrpSpPr>
-        <p:cNvPr id="1" name=""/>
-        <p:cNvGrpSpPr/>
-        <p:nvPr/>
-      </p:nvGrpSpPr>
-      <p:grpSpPr>
-        <a:xfrm>
-          <a:off x="0" y="0"/>
-          <a:ext cx="0" cy="0"/>
-          <a:chOff x="0" y="0"/>
-          <a:chExt cx="0" cy="0"/>
-        </a:xfrm>
-      </p:grpSpPr>
-      <p:sp>
-        <p:nvSpPr>
-          <p:cNvPr id="2" name="Title 1"/>
-          <p:cNvSpPr>
-            <a:spLocks noGrp="1"/>
-          </p:cNvSpPr>
-          <p:nvPr>
-            <p:ph type="title"/>
-          </p:nvPr>
-        </p:nvSpPr>
-        <p:spPr/>
-        <p:txBody>
-          <a:bodyPr/>
-          <a:lstStyle/>
-          <a:p>
-            <a:r>
-              <a:rPr dirty="0" lang="en-US" smtClean="0"/>
-              <a:t>Why Mac?</a:t>
-            </a:r>
-            <a:endParaRPr dirty="0" lang="en-US"/>
-          </a:p>
-        </p:txBody>
-      </p:sp>
-      <p:sp>
-        <p:nvSpPr>
-          <p:cNvPr id="3" name="Content Placeholder 2"/>
-          <p:cNvSpPr>
-            <a:spLocks noGrp="1"/>
-          </p:cNvSpPr>
-          <p:nvPr>
-            <p:ph idx="1"/>
-          </p:nvPr>
-        </p:nvSpPr>
-        <p:spPr/>
-        <p:txBody>
-          <a:bodyPr/>
-          <a:lstStyle/>
-          <a:p>
-            <a:r>
-              <a:rPr dirty="0" lang="en-US" smtClean="0"/>
-              <a:t>Its cool!</a:t>
-            </a:r>
-          </a:p>
-          <a:p>
-            <a:r>
-              <a:rPr dirty="0" lang="en-US" smtClean="0"/>
-              <a:t>Its light!</a:t>
-            </a:r>
-            <a:endParaRPr lang="en-US"/>
-          </a:p>
-        </p:txBody>
-      </p:sp>
-    </p:spTree>
-    <p:extLst>
-      <p:ext uri="{BB962C8B-B14F-4D97-AF65-F5344CB8AC3E}">
-        <p14:creationId xmlns:p14="http://schemas.microsoft.com/office/powerpoint/2010/main" val="1231192379"/>
-      </p:ext>
-    </p:extLst>
-  </p:cSld>
-  <p:clrMapOvr>
-    <a:masterClrMapping/>
-  </p:clrMapOvr>
-</p:sld>
-</file>
-
-<file path=ppt/slides/slide6.xml><?xml version="1.0" encoding="utf-8"?>
-<p:sld xmlns:a="http://schemas.openxmlformats.org/drawingml/2006/main" xmlns:p="http://schemas.openxmlformats.org/presentationml/2006/main" xmlns:r="http://schemas.openxmlformats.org/officeDocument/2006/relationships">
-  <p:cSld>
-    <p:spTree>
-      <p:nvGrpSpPr>
-        <p:cNvPr id="1" name=""/>
-        <p:cNvGrpSpPr/>
-        <p:nvPr/>
-      </p:nvGrpSpPr>
-      <p:grpSpPr>
-        <a:xfrm>
-          <a:off x="0" y="0"/>
-          <a:ext cx="0" cy="0"/>
-          <a:chOff x="0" y="0"/>
-          <a:chExt cx="0" cy="0"/>
-        </a:xfrm>
-      </p:grpSpPr>
-      <p:sp>
-        <p:nvSpPr>
-          <p:cNvPr id="2" name="Title 1"/>
-          <p:cNvSpPr>
-            <a:spLocks noGrp="1"/>
-          </p:cNvSpPr>
-          <p:nvPr>
-            <p:ph type="title"/>
-          </p:nvPr>
-        </p:nvSpPr>
-        <p:spPr/>
-        <p:txBody>
-          <a:bodyPr/>
-          <a:lstStyle/>
-          <a:p>
-            <a:r>
-              <a:rPr dirty="0" lang="en-US" smtClean="0"/>
-              <a:t>Why Iphone?</a:t>
-            </a:r>
-            <a:endParaRPr dirty="0" lang="en-US"/>
-          </a:p>
-        </p:txBody>
-      </p:sp>
-      <p:sp>
-        <p:nvSpPr>
-          <p:cNvPr id="3" name="Content Placeholder 2"/>
-          <p:cNvSpPr>
-            <a:spLocks noGrp="1"/>
-          </p:cNvSpPr>
-          <p:nvPr>
-            <p:ph idx="1"/>
-          </p:nvPr>
-        </p:nvSpPr>
-        <p:spPr/>
-        <p:txBody>
-          <a:bodyPr/>
-          <a:lstStyle/>
-          <a:p>
-            <a:r>
-              <a:rPr dirty="0" lang="en-US" smtClean="0"/>
-              <a:t>Its fast!</a:t>
-            </a:r>
-          </a:p>
-          <a:p>
-            <a:r>
-              <a:rPr dirty="0" lang="en-US" smtClean="0"/>
-              <a:t>Its cheap!</a:t>
-            </a:r>
-            <a:endParaRPr lang="en-US"/>
-          </a:p>
-        </p:txBody>
-      </p:sp>
-    </p:spTree>
-    <p:extLst>
-      <p:ext uri="{BB962C8B-B14F-4D97-AF65-F5344CB8AC3E}">
-        <p14:creationId xmlns:p14="http://schemas.microsoft.com/office/powerpoint/2010/main" val="1231192379"/>
-      </p:ext>
-    </p:extLst>
-  </p:cSld>
-  <p:clrMapOvr>
-    <a:masterClrMapping/>
-  </p:clrMapOvr>
-</p:sld>
-</file>
-
-<file path=ppt/slides/slide7.xml><?xml version="1.0" encoding="utf-8"?>
-<p:sld xmlns:a="http://schemas.openxmlformats.org/drawingml/2006/main" xmlns:p="http://schemas.openxmlformats.org/presentationml/2006/main" xmlns:r="http://schemas.openxmlformats.org/officeDocument/2006/relationships">
-  <p:cSld>
-    <p:spTree>
-      <p:nvGrpSpPr>
-        <p:cNvPr id="1" name=""/>
-        <p:cNvGrpSpPr/>
-        <p:nvPr/>
-      </p:nvGrpSpPr>
-      <p:grpSpPr>
-        <a:xfrm>
-          <a:off x="0" y="0"/>
-          <a:ext cx="0" cy="0"/>
-          <a:chOff x="0" y="0"/>
-          <a:chExt cx="0" cy="0"/>
-        </a:xfrm>
-      </p:grpSpPr>
-      <p:sp>
-        <p:nvSpPr>
-          <p:cNvPr id="2" name="Title 1"/>
-          <p:cNvSpPr>
-            <a:spLocks noGrp="1"/>
-          </p:cNvSpPr>
-          <p:nvPr>
-            <p:ph type="title"/>
-          </p:nvPr>
-        </p:nvSpPr>
-        <p:spPr/>
-        <p:txBody>
-          <a:bodyPr/>
-          <a:lstStyle/>
-          <a:p>
-            <a:r>
-              <a:rPr dirty="0" lang="en-US" smtClean="0"/>
-              <a:t>JPG Logo</a:t>
-            </a:r>
-            <a:endParaRPr dirty="0" lang="en-US"/>
-          </a:p>
-        </p:txBody>
-      </p:sp>
-      <p:pic>
-        <p:nvPicPr>
-          <p:cNvPr id="4" name="Content Placeholder 3"/>
-          <p:cNvPicPr>
-            <a:picLocks noChangeAspect="1" noGrp="1"/>
-          </p:cNvPicPr>
-          <p:nvPr>
-            <p:ph idx="1"/>
-          </p:nvPr>
-        </p:nvPicPr>
-        <p:blipFill>
-          <a:blip r:embed="rId2">
-            <a:extLst>
-              <a:ext uri="{28A0092B-C50C-407E-A947-70E740481C1C}">
-                <a14:useLocalDpi xmlns:a14="http://schemas.microsoft.com/office/drawing/2010/main" val="0"/>
-              </a:ext>
-            </a:extLst>
-          </a:blip>
-          <a:stretch>
-            <a:fillRect/>
-          </a:stretch>
-        </p:blipFill>
-        <p:spPr>
-          <a:xfrm>
-            <a:off x="2794000" y="1524000"/>
-            <a:ext cx="3556000" cy="2667000"/>
-          </a:xfrm>
-          <a:prstGeom prst="rect">
-            <a:avLst/>
-          </a:prstGeom>
-        </p:spPr>
-      </p:pic>
-    </p:spTree>
-    <p:extLst>
-      <p:ext uri="{BB962C8B-B14F-4D97-AF65-F5344CB8AC3E}">
-        <p14:creationId xmlns:p14="http://schemas.microsoft.com/office/powerpoint/2010/main" val="1474098577"/>
-      </p:ext>
-    </p:extLst>
-  </p:cSld>
-  <p:clrMapOvr>
-    <a:masterClrMapping/>
-  </p:clrMapOvr>
-</p:sld>
-</file>
-
-<file path=ppt/slides/slide8.xml><?xml version="1.0" encoding="utf-8"?>
 <p:sld xmlns:a="http://schemas.openxmlformats.org/drawingml/2006/main" xmlns:r="http://schemas.openxmlformats.org/officeDocument/2006/relationships" xmlns:p="http://schemas.openxmlformats.org/presentationml/2006/main">
   <p:cSld>
     <p:spTree>
@@ -20085,12 +19472,12 @@
       </p:grpSpPr>
       <p:sp>
         <p:nvSpPr>
-          <p:cNvPr id="2" name="Title 1"/>
+          <p:cNvPr id="6" name="Text Placeholder 5"/>
           <p:cNvSpPr>
             <a:spLocks noGrp="1"/>
           </p:cNvSpPr>
           <p:nvPr>
-            <p:ph type="title"/>
+            <p:ph type="body" sz="quarter" idx="10"/>
           </p:nvPr>
         </p:nvSpPr>
         <p:spPr/>
@@ -20100,88 +19487,520 @@
           <a:p>
             <a:r>
               <a:rPr lang="en-US" dirty="0" smtClean="0"/>
-              <a:t>Text Pic Split</a:t>
+              <a:t/>
             </a:r>
-            <a:endParaRPr lang="en-US" dirty="0"/>
           </a:p>
         </p:txBody>
       </p:sp>
       <p:sp>
         <p:nvSpPr>
-          <p:cNvPr id="3" name="Content Placeholder 2"/>
+          <p:cNvPr id="10" name="Title 9"/>
           <p:cNvSpPr>
             <a:spLocks noGrp="1"/>
           </p:cNvSpPr>
           <p:nvPr>
-            <p:ph sz="half" idx="1"/>
+            <p:ph type="title"/>
           </p:nvPr>
         </p:nvSpPr>
-        <p:spPr/>
+        <p:spPr>
+          <a:prstGeom prst="rect">
+            <a:avLst/>
+          </a:prstGeom>
+        </p:spPr>
         <p:txBody>
           <a:bodyPr/>
           <a:lstStyle/>
           <a:p>
             <a:r>
-              <a:rPr lang="en-US" dirty="0" smtClean="0"/>
-              <a:t>Here is a string</a:t>
+              <a:rPr lang="en-US" sz="3200" dirty="0" smtClean="0"/>
+              <a:t>Lorem Ipsum Dolor Sit Amet</a:t>
             </a:r>
-          </a:p>
-          <a:p>
-            <a:r>
-              <a:rPr lang="en-US" dirty="0" smtClean="0"/>
-              <a:t>here is another</a:t>
-            </a:r>
-            <a:endParaRPr lang="en-US"/>
+            <a:endParaRPr lang="en-US" sz="3200" dirty="0"/>
           </a:p>
         </p:txBody>
       </p:sp>
-      <p:pic>
-        <p:nvPicPr>
-          <p:cNvPr id="4" name="Content Placeholder 3"/>
-          <p:cNvPicPr>
-            <a:picLocks noGrp="1" noChangeAspect="1"/>
-          </p:cNvPicPr>
+      <p:graphicFrame>
+        <p:nvGraphicFramePr>
+          <p:cNvPr id="7" name="Content Placeholder 6"/>
+          <p:cNvGraphicFramePr>
+            <a:graphicFrameLocks noGrp="1"/>
+          </p:cNvGraphicFramePr>
           <p:nvPr>
-            <p:ph sz="half" idx="2"/>
+            <p:ph idx="1"/>
           </p:nvPr>
-        </p:nvPicPr>
-        <p:blipFill>
-          <a:blip r:embed="rId2">
-            <a:extLst>
-              <a:ext uri="{28A0092B-C50C-407E-A947-70E740481C1C}">
-                <a14:useLocalDpi xmlns:a14="http://schemas.microsoft.com/office/drawing/2010/main" val="0"/>
-              </a:ext>
-            </a:extLst>
-          </a:blip>
-          <a:stretch>
-            <a:fillRect/>
-          </a:stretch>
-        </p:blipFill>
-        <p:spPr>
-          <a:xfrm>
-            <a:off x="4572000" y="1524000"/>
-            <a:ext cx="3556000" cy="2667000"/>
-          </a:xfrm>
-          <a:prstGeom prst="rect">
-            <a:avLst/>
-          </a:prstGeom>
-        </p:spPr>
-      </p:pic>
+        </p:nvGraphicFramePr>
+        <p:xfrm>
+          <a:off x="250825" y="873125"/>
+          <a:ext cx="8642350" cy="5073696"/>
+        </p:xfrm>
+        <a:graphic>
+          <a:graphicData uri="http://schemas.openxmlformats.org/drawingml/2006/table">
+            <a:tbl>
+              <a:tblPr firstRow="1" bandRow="1">
+                <a:tableStyleId>{5C22544A-7EE6-4342-B048-85BDC9FD1C3A}</a:tableStyleId>
+              </a:tblPr>
+              <a:tblGrid>
+                <a:gridCol w="8642350"/>
+              </a:tblGrid>
+              <a:tr h="912080">
+                <a:tc>
+                  <a:txBody>
+                    <a:bodyPr/>
+                    <a:lstStyle/>
+                    <a:p>
+                      <a:pPr algn="ctr" rtl="0" eaLnBrk="1" fontAlgn="t" latinLnBrk="0" hangingPunct="1">
+                        <a:lnSpc>
+                          <a:spcPct val="90000"/>
+                        </a:lnSpc>
+                        <a:spcAft>
+                          <a:spcPts val="600"/>
+                        </a:spcAft>
+                      </a:pPr>
+                      <a:r>
+                        <a:rPr lang="en-US" sz="2400" b="1" i="0" u="none" strike="noStrike" kern="1200" baseline="0" noProof="0" dirty="0" smtClean="0">
+                          <a:solidFill>
+                            <a:schemeClr val="bg1"/>
+                          </a:solidFill>
+                          <a:latin typeface="+mn-lt"/>
+                          <a:ea typeface="+mn-ea"/>
+                          <a:cs typeface="+mn-cs"/>
+                        </a:rPr>
+                        <a:t>Lorem Ipsum Dolor Consec</a:t>
+                      </a:r>
+                    </a:p>
+                    <a:p>
+                      <a:pPr marL="0" indent="0">
+                        <a:spcAft>
+                          <a:spcPts val="600"/>
+                        </a:spcAft>
+                        <a:buNone/>
+                      </a:pPr>
+                      <a:r>
+                        <a:rPr lang="en-US" sz="1600" b="0" noProof="0" dirty="0" smtClean="0"/>
+                        <a:t xml:space="preserve">Sum expectantes. Ego hodie expectantes. Expectantes, et misit unum de pueris Gus interficere. Et suus vos. Nescio quis, qui est bonus usus liberi ad Isai? Qui nosti ... Quis dimisit filios ad necem ... hmm? Gus! Est, ante me factus singulis decem gradibus. Et nunc ad aliud opus mihi tandem tollendum est puer ille consensus et nunc fugit. Ipse suus obtinuit eam. Non solum autem illa, sed te tractantur in se trahens felis. </a:t>
+                      </a:r>
+                    </a:p>
+                    <!--
+                                        <a:p>
+                                            <a:pPr algn="ctr" rtl="0" eaLnBrk="1" fontAlgn="t" latinLnBrk="0" hangingPunct="1">
+                                                <a:lnSpc>
+                                                    <a:spcPct val="90000"/>
+                                                </a:lnSpc>
+                                                <a:spcAft>
+                                                    <a:spcPts val="600"/>
+                                                </a:spcAft>
+                                            </a:pPr>
+                                            <a:r>
+                                                <a:rPr lang="en-US" sz="1600" b="0" i="0" u="none" strike="noStrike" kern="1200" baseline="0" noProof="0" dirty="0" smtClean="0">
+                                                    <a:solidFill>
+                                                        <a:schemeClr val="bg1"/>
+                                                    </a:solidFill>
+                                                    <a:latin typeface="+mn-lt"/>
+                                                    <a:ea typeface="+mn-ea"/>
+                                                    <a:cs typeface="+mn-cs"/>
+                                                </a:rPr>
+                                                <a:t>Expectations about the speed and ease of payments are reshaping and customers expect any payment delay to be eliminated. As payment processes are streamlined, cashiers </a:t>
+                                            </a:r>
+                                            <a:r>
+                                                <a:rPr lang="en-US" sz="1600" b="0" i="0" u="none" strike="noStrike" kern="1200" baseline="0" noProof="0" dirty="0" err="1" smtClean="0">
+                                                    <a:solidFill>
+                                                        <a:schemeClr val="bg1"/>
+                                                    </a:solidFill>
+                                                    <a:latin typeface="+mn-lt"/>
+                                                    <a:ea typeface="+mn-ea"/>
+                                                    <a:cs typeface="+mn-cs"/>
+                                                </a:rPr>
+                                                <a:t>decentralised</a:t>
+                                            </a:r>
+                                            <a:r>
+                                                <a:rPr lang="en-US" sz="1600" b="0" i="0" u="none" strike="noStrike" kern="1200" baseline="0" noProof="0" dirty="0" smtClean="0">
+                                                    <a:solidFill>
+                                                        <a:schemeClr val="bg1"/>
+                                                    </a:solidFill>
+                                                    <a:latin typeface="+mn-lt"/>
+                                                    <a:ea typeface="+mn-ea"/>
+                                                    <a:cs typeface="+mn-cs"/>
+                                                </a:rPr>
+                                                <a:t> and </a:t>
+                                            </a:r>
+                                            <a:r>
+                                                <a:rPr lang="en-US" sz="1600" b="0" i="0" u="none" strike="noStrike" kern="1200" baseline="0" noProof="0" dirty="0" err="1" smtClean="0">
+                                                    <a:solidFill>
+                                                        <a:schemeClr val="bg1"/>
+                                                    </a:solidFill>
+                                                    <a:latin typeface="+mn-lt"/>
+                                                    <a:ea typeface="+mn-ea"/>
+                                                    <a:cs typeface="+mn-cs"/>
+                                                </a:rPr>
+                                                <a:t>painpoints</a:t>
+                                            </a:r>
+                                            <a:r>
+                                                <a:rPr lang="en-US" sz="1600" b="0" i="0" u="none" strike="noStrike" kern="1200" baseline="0" noProof="0" dirty="0" smtClean="0">
+                                                    <a:solidFill>
+                                                        <a:schemeClr val="bg1"/>
+                                                    </a:solidFill>
+                                                    <a:latin typeface="+mn-lt"/>
+                                                    <a:ea typeface="+mn-ea"/>
+                                                    <a:cs typeface="+mn-cs"/>
+                                                </a:rPr>
+                                                <a:t> removed, payment will become near invisible. Brands who can provide these seamlessness or who experiment with novel ways to pay, such as biometric payments, will win favour.</a:t>
+                                            </a:r>
+                                            <a:endParaRPr lang="en-US" sz="1800" b="0" i="0" u="none" strike="noStrike" kern="1200" baseline="0" noProof="0" dirty="0" smtClean="0">
+                                                <a:solidFill>
+                                                    <a:schemeClr val="bg1"/>
+                                                </a:solidFill>
+                                                <a:latin typeface="+mn-lt"/>
+                                                <a:ea typeface="+mn-ea"/>
+                                                <a:cs typeface="+mn-cs"/>
+                                            </a:endParaRPr>
+                                        </a:p>
+                                        //-->
+                  </a:txBody>
+                  <a:tcPr marB="216000" anchor="ctr">
+                    <a:lnL w="12700" cmpd="sng">
+                      <a:noFill/>
+                    </a:lnL>
+                    <a:lnR w="12700" cmpd="sng">
+                      <a:noFill/>
+                    </a:lnR>
+                    <a:lnT w="12700" cmpd="sng">
+                      <a:noFill/>
+                    </a:lnT>
+                    <a:lnB w="12700" cap="flat" cmpd="sng" algn="ctr">
+                      <a:noFill/>
+                      <a:prstDash val="solid"/>
+                      <a:round/>
+                      <a:headEnd type="none" w="med" len="med"/>
+                      <a:tailEnd type="none" w="med" len="med"/>
+                    </a:lnB>
+                    <a:lnTlToBr w="12700" cmpd="sng">
+                      <a:noFill/>
+                      <a:prstDash val="solid"/>
+                    </a:lnTlToBr>
+                    <a:lnBlToTr w="12700" cmpd="sng">
+                      <a:noFill/>
+                      <a:prstDash val="solid"/>
+                    </a:lnBlToTr>
+                    <a:noFill/>
+                  </a:tcPr>
+                </a:tc>
+              </a:tr>
+              <a:tr h="881154">
+                <a:tc>
+                  <a:txBody>
+                    <a:bodyPr/>
+                    <a:lstStyle/>
+                    <a:p>
+                      <a:pPr marL="0" marR="0" indent="0" algn="ctr" defTabSz="457200" rtl="0" eaLnBrk="1" fontAlgn="auto" latinLnBrk="0" hangingPunct="1">
+                        <a:lnSpc>
+                          <a:spcPct val="90000"/>
+                        </a:lnSpc>
+                        <a:spcBef>
+                          <a:spcPts val="0"/>
+                        </a:spcBef>
+                        <a:spcAft>
+                          <a:spcPts val="600"/>
+                        </a:spcAft>
+                        <a:buClrTx/>
+                        <a:buSzTx/>
+                        <a:buFontTx/>
+                        <a:buNone/>
+                        <a:tabLst/>
+                        <a:defRPr/>
+                      </a:pPr>
+                      <a:r>
+                        <a:rPr lang="en-US" sz="2400" b="1" i="0" u="none" strike="noStrike" kern="1200" baseline="0" noProof="0" dirty="0" smtClean="0">
+                          <a:solidFill>
+                            <a:schemeClr val="bg1"/>
+                          </a:solidFill>
+                          <a:latin typeface="+mn-lt"/>
+                          <a:ea typeface="+mn-ea"/>
+                          <a:cs typeface="+mn-cs"/>
+                        </a:rPr>
+                        <a:t>Consectetur Adipiscing</a:t>
+                      </a:r>
+                    </a:p>
+                    <a:p>
+                      <a:pPr marL="0" indent="0">
+                        <a:spcAft>
+                          <a:spcPts val="600"/>
+                        </a:spcAft>
+                        <a:buNone/>
+                      </a:pPr>
+                      <a:r>
+                        <a:rPr lang="en-US" sz="1600" b="0" noProof="0" dirty="0" smtClean="0"/>
+                        <a:t xml:space="preserve">Sum expectantes. Ego hodie expectantes. Expectantes, et misit unum de pueris Gus interficere. Et suus vos. Nescio quis, qui est bonus usus liberi ad Isai?</a:t>
+                      </a:r>
+                    </a:p>
+                    <a:p>
+                      <a:pPr marL="0" indent="0">
+                        <a:spcAft>
+                          <a:spcPts val="600"/>
+                        </a:spcAft>
+                        <a:buNone/>
+                      </a:pPr>
+                      <a:r>
+                        <a:rPr lang="en-US" sz="1600" b="0" noProof="0" dirty="0" smtClean="0"/>
+                        <a:t xml:space="preserve">Qui nosti ... Quis dimisit filios ad necem ... hmm? Gus! Est, ante me factus singulis decem gradibus.</a:t>
+                      </a:r>
+                    </a:p>
+                    <a:p>
+                      <a:pPr marL="0" indent="0">
+                        <a:spcAft>
+                          <a:spcPts val="600"/>
+                        </a:spcAft>
+                        <a:buNone/>
+                      </a:pPr>
+                      <a:r>
+                        <a:rPr lang="en-US" sz="1600" b="0" noProof="0" dirty="0" smtClean="0"/>
+                        <a:t xml:space="preserve">Et nunc ad aliud opus mihi tandem tollendum est puer ille consensus et nunc fugit. Ipse suus obtinuit eam. Non solum autem illa, sed te tractantur in se trahens felis. </a:t>
+                      </a:r>
+                    </a:p>
+                    <!--
+                                        <a:p>
+                                            <a:pPr marL="0" marR="0" indent="0" algn="ctr" defTabSz="457200" rtl="0" eaLnBrk="1" fontAlgn="auto" latinLnBrk="0" hangingPunct="1">
+                                                <a:lnSpc>
+                                                    <a:spcPct val="90000"/>
+                                                </a:lnSpc>
+                                                <a:spcBef>
+                                                    <a:spcPts val="0"/>
+                                                </a:spcBef>
+                                                <a:spcAft>
+                                                    <a:spcPts val="600"/>
+                                                </a:spcAft>
+                                                <a:buClrTx/>
+                                                <a:buSzTx/>
+                                                <a:buFontTx/>
+                                                <a:buNone/>
+                                                <a:tabLst/>
+                                                <a:defRPr/>
+                                            </a:pPr>
+                                            <a:r>
+                                                <a:rPr lang="en-US" sz="1600" b="0" noProof="0" dirty="0" smtClean="0">
+                                                    <a:solidFill>
+                                                        <a:schemeClr val="bg1"/>
+                                                    </a:solidFill>
+                                                </a:rPr>
+                                                <a:t>Privacy concerns surrounding how</a:t>
+                                            </a:r>
+                                            <a:r>
+                                                <a:rPr lang="en-US" sz="1600" b="0" baseline="0" noProof="0" dirty="0" smtClean="0">
+                                                    <a:solidFill>
+                                                        <a:schemeClr val="bg1"/>
+                                                    </a:solidFill>
+                                                </a:rPr>
+                                                <a:t> easily cashless payments can be tracked remain a barrier. Nonetheless, the convenience of cashless, combined with the greater tracking capabilities it gives to consumers themselves will help win many over, although we posit that cash will still have a limited place into the 2020s.</a:t>
+                                            </a:r>
+                                            <a:endParaRPr lang="en-US" sz="1800" b="0" noProof="0" dirty="0" smtClean="0">
+                                                <a:solidFill>
+                                                    <a:schemeClr val="bg1"/>
+                                                </a:solidFill>
+                                            </a:endParaRPr>
+                                        </a:p>
+                                        //-->
+                  </a:txBody>
+                  <a:tcPr marB="216000" anchor="ctr">
+                    <a:lnL w="12700" cmpd="sng">
+                      <a:noFill/>
+                    </a:lnL>
+                    <a:lnR w="12700" cmpd="sng">
+                      <a:noFill/>
+                    </a:lnR>
+                    <a:lnT w="12700" cap="flat" cmpd="sng" algn="ctr">
+                      <a:noFill/>
+                      <a:prstDash val="solid"/>
+                      <a:round/>
+                      <a:headEnd type="none" w="med" len="med"/>
+                      <a:tailEnd type="none" w="med" len="med"/>
+                    </a:lnT>
+                    <a:lnB w="12700" cap="flat" cmpd="sng" algn="ctr">
+                      <a:noFill/>
+                      <a:prstDash val="solid"/>
+                      <a:round/>
+                      <a:headEnd type="none" w="med" len="med"/>
+                      <a:tailEnd type="none" w="med" len="med"/>
+                    </a:lnB>
+                    <a:lnTlToBr w="12700" cmpd="sng">
+                      <a:noFill/>
+                      <a:prstDash val="solid"/>
+                    </a:lnTlToBr>
+                    <a:lnBlToTr w="12700" cmpd="sng">
+                      <a:noFill/>
+                      <a:prstDash val="solid"/>
+                    </a:lnBlToTr>
+                    <a:noFill/>
+                  </a:tcPr>
+                </a:tc>
+              </a:tr>
+              <a:tr h="1050673">
+                <a:tc>
+                  <a:txBody>
+                    <a:bodyPr/>
+                    <a:lstStyle/>
+                    <a:p>
+                      <a:pPr marL="0" marR="0" indent="0" algn="ctr" defTabSz="457200" rtl="0" eaLnBrk="1" fontAlgn="auto" latinLnBrk="0" hangingPunct="1">
+                        <a:lnSpc>
+                          <a:spcPct val="90000"/>
+                        </a:lnSpc>
+                        <a:spcBef>
+                          <a:spcPts val="0"/>
+                        </a:spcBef>
+                        <a:spcAft>
+                          <a:spcPts val="600"/>
+                        </a:spcAft>
+                        <a:buClrTx/>
+                        <a:buSzTx/>
+                        <a:buFontTx/>
+                        <a:buNone/>
+                        <a:tabLst/>
+                        <a:defRPr/>
+                      </a:pPr>
+                      <a:r>
+                        <a:rPr lang="en-US" sz="2400" b="1" i="0" u="none" strike="noStrike" kern="1200" baseline="0" noProof="0" dirty="0" smtClean="0">
+                          <a:solidFill>
+                            <a:schemeClr val="bg1"/>
+                          </a:solidFill>
+                          <a:latin typeface="+mn-lt"/>
+                          <a:ea typeface="+mn-ea"/>
+                          <a:cs typeface="+mn-cs"/>
+                        </a:rPr>
+                        <a:t>Pariatur Consectetur</a:t>
+                      </a:r>
+                    </a:p>
+                    <a:p>
+                      <a:pPr marL="0" indent="0">
+                        <a:spcAft>
+                          <a:spcPts val="600"/>
+                        </a:spcAft>
+                        <a:buNone/>
+                      </a:pPr>
+                      <a:r>
+                        <a:rPr lang="en-US" sz="1600" b="0" noProof="0" dirty="0" smtClean="0"/>
+                        <a:t xml:space="preserve">Sum expectantes. Ego hodie expectantes. Expectantes, et misit unum de pueris Gus interficere. Et suus vos. Nescio quis, qui est bonus usus liberi ad Isai? Qui nosti ... Quis dimisit filios ad necem ... hmm? Gus! </a:t>
+                      </a:r>
+                    </a:p>
+                    <a:p>
+                      <a:pPr marL="0" indent="0">
+                        <a:spcAft>
+                          <a:spcPts val="600"/>
+                        </a:spcAft>
+                        <a:buNone/>
+                      </a:pPr>
+                      <a:r>
+                        <a:rPr lang="en-US" sz="1600" b="0" noProof="0" dirty="0" smtClean="0"/>
+                        <a:t xml:space="preserve">Est, ante me factus singulis decem gradibus.</a:t>
+                      </a:r>
+                    </a:p>
+                    <!--
+                                        <a:p>
+                                            <a:pPr marL="0" marR="0" indent="0" algn="ctr" defTabSz="457200" rtl="0" eaLnBrk="1" fontAlgn="auto" latinLnBrk="0" hangingPunct="1">
+                                                <a:lnSpc>
+                                                    <a:spcPct val="90000"/>
+                                                </a:lnSpc>
+                                                <a:spcBef>
+                                                    <a:spcPts val="0"/>
+                                                </a:spcBef>
+                                                <a:spcAft>
+                                                    <a:spcPts val="600"/>
+                                                </a:spcAft>
+                                                <a:buClrTx/>
+                                                <a:buSzTx/>
+                                                <a:buFontTx/>
+                                                <a:buNone/>
+                                                <a:tabLst/>
+                                                <a:defRPr/>
+                                            </a:pPr>
+                                            <a:r>
+                                                <a:rPr lang="en-US" sz="1600" b="0" i="0" u="none" strike="noStrike" kern="1200" baseline="0" noProof="0" dirty="0" smtClean="0">
+                                                    <a:solidFill>
+                                                        <a:schemeClr val="bg1"/>
+                                                    </a:solidFill>
+                                                    <a:latin typeface="+mn-lt"/>
+                                                    <a:ea typeface="+mn-ea"/>
+                                                    <a:cs typeface="+mn-cs"/>
+                                                </a:rPr>
+                                                <a:t>Interest in contactless card usage is highest in Gen Y but real usage is most differentiated by social grade. 15% more AB respondents use contactless cards that DE. Reasons for not adopting new payment technology were mostly due to unfamiliarity, followed by security fears. For the 65+  -  not owning technology such as </a:t>
+                                            </a:r>
+                                            <a:r>
+                                                <a:rPr lang="en-US" sz="1600" b="0" i="0" u="none" strike="noStrike" kern="1200" baseline="0" noProof="0" dirty="0" err="1" smtClean="0">
+                                                    <a:solidFill>
+                                                        <a:schemeClr val="bg1"/>
+                                                    </a:solidFill>
+                                                    <a:latin typeface="+mn-lt"/>
+                                                    <a:ea typeface="+mn-ea"/>
+                                                    <a:cs typeface="+mn-cs"/>
+                                                </a:rPr>
+                                                <a:t>smartphones</a:t>
+                                            </a:r>
+                                            <a:r>
+                                                <a:rPr lang="en-US" sz="1600" b="0" i="0" u="none" strike="noStrike" kern="1200" baseline="0" noProof="0" dirty="0" smtClean="0">
+                                                    <a:solidFill>
+                                                        <a:schemeClr val="bg1"/>
+                                                    </a:solidFill>
+                                                    <a:latin typeface="+mn-lt"/>
+                                                    <a:ea typeface="+mn-ea"/>
+                                                    <a:cs typeface="+mn-cs"/>
+                                                </a:rPr>
+                                                <a:t> is also a huge barrier and brands will have to ensure that they do not alienate consumers in an effort to be more efficient. </a:t>
+                                            </a:r>
+                                        </a:p>
+                                      //-->
+                  </a:txBody>
+                  <a:tcPr marB="216000" anchor="ctr">
+                    <a:lnL w="12700" cmpd="sng">
+                      <a:noFill/>
+                    </a:lnL>
+                    <a:lnR w="12700" cmpd="sng">
+                      <a:noFill/>
+                    </a:lnR>
+                    <a:lnT w="12700" cap="flat" cmpd="sng" algn="ctr">
+                      <a:noFill/>
+                      <a:prstDash val="solid"/>
+                      <a:round/>
+                      <a:headEnd type="none" w="med" len="med"/>
+                      <a:tailEnd type="none" w="med" len="med"/>
+                    </a:lnT>
+                    <a:lnB w="12700" cap="flat" cmpd="sng" algn="ctr">
+                      <a:noFill/>
+                      <a:prstDash val="solid"/>
+                      <a:round/>
+                      <a:headEnd type="none" w="med" len="med"/>
+                      <a:tailEnd type="none" w="med" len="med"/>
+                    </a:lnB>
+                    <a:lnTlToBr w="12700" cmpd="sng">
+                      <a:noFill/>
+                      <a:prstDash val="solid"/>
+                    </a:lnTlToBr>
+                    <a:lnBlToTr w="12700" cmpd="sng">
+                      <a:noFill/>
+                      <a:prstDash val="solid"/>
+                    </a:lnBlToTr>
+                    <a:noFill/>
+                  </a:tcPr>
+                </a:tc>
+              </a:tr>
+            </a:tbl>
+          </a:graphicData>
+        </a:graphic>
+      </p:graphicFrame>
     </p:spTree>
-    <p:extLst>
-      <p:ext uri="{BB962C8B-B14F-4D97-AF65-F5344CB8AC3E}">
-        <p14:creationId xmlns:p14="http://schemas.microsoft.com/office/powerpoint/2010/main" val="1435759726"/>
-      </p:ext>
-    </p:extLst>
   </p:cSld>
   <p:clrMapOvr>
     <a:masterClrMapping/>
   </p:clrMapOvr>
+  <p:transition spd="med"/>
+  <p:timing>
+    <p:tnLst>
+      <p:par>
+        <p:cTn id="1" dur="indefinite" restart="never" nodeType="tmRoot"/>
+      </p:par>
+    </p:tnLst>
+  </p:timing>
 </p:sld>
 </file>
 
-<file path=ppt/slides/slide9.xml><?xml version="1.0" encoding="utf-8"?>
-<p:sld xmlns:a="http://schemas.openxmlformats.org/drawingml/2006/main" xmlns:p="http://schemas.openxmlformats.org/presentationml/2006/main" xmlns:r="http://schemas.openxmlformats.org/officeDocument/2006/relationships">
+<file path=ppt/slides/slide6.xml><?xml version="1.0" encoding="utf-8"?>
+<p:sld xmlns:a="http://schemas.openxmlformats.org/drawingml/2006/main" xmlns:r="http://schemas.openxmlformats.org/officeDocument/2006/relationships" xmlns:p="http://schemas.openxmlformats.org/presentationml/2006/main">
   <p:cSld>
     <p:spTree>
       <p:nvGrpSpPr>
@@ -20199,7 +20018,160 @@
       </p:grpSpPr>
       <p:sp>
         <p:nvSpPr>
-          <p:cNvPr id="2" name="Title 1"/>
+          <p:cNvPr id="2" name="Content Placeholder 1"/>
+          <p:cNvSpPr>
+            <a:spLocks noGrp="1"/>
+          </p:cNvSpPr>
+          <p:nvPr>
+            <p:ph idx="1"/>
+          </p:nvPr>
+        </p:nvSpPr>
+        <p:spPr>
+          <a:xfrm>
+            <a:off x="250826" y="873126"/>
+            <a:ext cx="8642348" cy="5111749"/>
+          </a:xfrm>
+        </p:spPr>
+        <p:txBody>
+          <a:bodyPr/>
+          <a:lstStyle/>
+          <a:p>
+            <a:pPr>
+              <a:spcBef>
+                <a:spcPts val="0"/>
+              </a:spcBef>
+              <a:spcAft>
+                <a:spcPts val="600"/>
+              </a:spcAft>
+            </a:pPr>
+            <a:r>
+              <a:rPr lang="en-GB" b="1" dirty="0" smtClean="0"/>
+              <a:t>Alcohol</a:t>
+            </a:r>
+          </a:p>
+          <a:p>
+            <a:pPr marL="0" indent="0">
+              <a:spcAft>
+                <a:spcPts val="600"/>
+              </a:spcAft>
+              <a:buNone/>
+            </a:pPr>
+            <a:r>
+              <a:rPr lang="en-US" sz="1600" b="0" noProof="0" dirty="0" smtClean="0"/>
+              <a:t xml:space="preserve">Lorem ipsum dolar sit amet consectetur...</a:t>
+            </a:r>
+          </a:p>
+          <a:p>
+            <a:pPr>
+              <a:spcBef>
+                <a:spcPts val="0"/>
+              </a:spcBef>
+              <a:spcAft>
+                <a:spcPts val="600"/>
+              </a:spcAft>
+            </a:pPr>
+            <a:r>
+              <a:rPr lang="en-GB" b="1" dirty="0" smtClean="0"/>
+              <a:t>Beauty and Personal Care</a:t>
+            </a:r>
+          </a:p>
+          <a:p>
+            <a:pPr marL="0" indent="0">
+              <a:spcAft>
+                <a:spcPts val="600"/>
+              </a:spcAft>
+              <a:buNone/>
+            </a:pPr>
+            <a:r>
+              <a:rPr lang="en-US" sz="1600" b="0" noProof="0" dirty="0" smtClean="0"/>
+              <a:t xml:space="preserve">Lorem ipsum dolar sit amet consectetur...</a:t>
+            </a:r>
+          </a:p>
+          <!--
+                    <a:p>
+                        <a:pPr>
+                            <a:spcBef>
+                                <a:spcPts val="0"/>
+                            </a:spcBef>
+                            <a:spcAft>
+                                <a:spcPts val="600"/>
+                            </a:spcAft>
+                            <a:buNone/>
+                        </a:pPr>
+                        <a:r>
+                            <a:rPr lang="en-GB" b="1" dirty="0" smtClean="0"/>
+                            <a:t>Digital</a:t>
+                        </a:r>
+                        <a:endParaRPr lang="en-GB" b="1" dirty="0" smtClean="0"/>
+                    </a:p>
+                    <a:p>
+                        <a:pPr>
+                            <a:spcBef>
+                                <a:spcPts val="0"/>
+                            </a:spcBef>
+                            <a:spcAft>
+                                <a:spcPts val="600"/>
+                            </a:spcAft>
+                        </a:pPr>
+                        <a:r>
+                            <a:rPr lang="en-GB" dirty="0" smtClean="0"/>
+                            <a:t>Consumer facing technology will be key to ensuring that cashless innovations keep up with consumer demand for speed, convenience and control. Importantly, consumers will seek technology that is capable of aggregating all of their spending and payment options, whilst fluidly switching across device or AI assistant. </a:t>
+                        </a:r>
+                    </a:p>
+                    <a:p>
+                        <a:pPr>
+                            <a:spcBef>
+                                <a:spcPts val="0"/>
+                            </a:spcBef>
+                            <a:spcAft>
+                                <a:spcPts val="600"/>
+                            </a:spcAft>
+                            <a:buNone/>
+                        </a:pPr>
+                        <a:r>
+                            <a:rPr lang="en-GB" b="1" dirty="0" smtClean="0"/>
+                            <a:t>Financial Services</a:t>
+                        </a:r>
+                    </a:p>
+                    <a:p>
+                        <a:pPr>
+                            <a:spcBef>
+                                <a:spcPts val="0"/>
+                            </a:spcBef>
+                            <a:spcAft>
+                                <a:spcPts val="600"/>
+                            </a:spcAft>
+                        </a:pPr>
+                        <a:r>
+                            <a:rPr lang="en-GB" dirty="0" smtClean="0"/>
+                            <a:t>Banks either need to lead innovation or partner with third party contactless providers to ensure that their customers can always have early access to the newest payment options. Furthermore, due to the legacy of trust that banks hold, they may be instrumental in promoting consumer uptake of contactless services, either by improving or verifying safety or promoting the simplicity and security of payments compared to more traditional payment options and may be fundamental to facilitating cross border and social media payments.</a:t>
+                        </a:r>
+                    </a:p>
+                    //-->
+        </p:txBody>
+      </p:sp>
+      <p:sp>
+        <p:nvSpPr>
+          <p:cNvPr id="3" name="Text Placeholder 2"/>
+          <p:cNvSpPr>
+            <a:spLocks noGrp="1"/>
+          </p:cNvSpPr>
+          <p:nvPr>
+            <p:ph type="body" sz="quarter" idx="10"/>
+          </p:nvPr>
+        </p:nvSpPr>
+        <p:spPr/>
+        <p:txBody>
+          <a:bodyPr/>
+          <a:lstStyle/>
+          <a:p>
+            <a:endParaRPr lang="en-GB"/>
+          </a:p>
+        </p:txBody>
+      </p:sp>
+      <p:sp>
+        <p:nvSpPr>
+          <p:cNvPr id="4" name="Title 3"/>
           <p:cNvSpPr>
             <a:spLocks noGrp="1"/>
           </p:cNvSpPr>
@@ -20213,55 +20185,19 @@
           <a:lstStyle/>
           <a:p>
             <a:r>
-              <a:rPr dirty="0" lang="en-US" smtClean="0"/>
-              <a:t>PNG Logo</a:t>
+              <a:rPr lang="en-GB" dirty="0" smtClean="0"/>
+              <a:t>Sector Implications</a:t>
             </a:r>
-            <a:endParaRPr dirty="0" lang="en-US"/>
+            <a:endParaRPr lang="en-GB" dirty="0"/>
           </a:p>
         </p:txBody>
       </p:sp>
-      <p:pic>
-        <p:nvPicPr>
-          <p:cNvPr id="4" name="Content Placeholder 3"/>
-          <p:cNvPicPr>
-            <a:picLocks noChangeAspect="1" noGrp="1"/>
-          </p:cNvPicPr>
-          <p:nvPr>
-            <p:ph idx="1"/>
-          </p:nvPr>
-        </p:nvPicPr>
-        <p:blipFill>
-          <a:blip r:embed="rId2">
-            <a:extLst>
-              <a:ext uri="{28A0092B-C50C-407E-A947-70E740481C1C}">
-                <a14:useLocalDpi xmlns:a14="http://schemas.microsoft.com/office/drawing/2010/main" val="0"/>
-              </a:ext>
-            </a:extLst>
-          </a:blip>
-          <a:stretch>
-            <a:fillRect/>
-          </a:stretch>
-        </p:blipFill>
-        <p:spPr>
-          <a:xfrm>
-            <a:off x="2794000" y="1524000"/>
-            <a:ext cx="3556000" cy="2667000"/>
-          </a:xfrm>
-          <a:prstGeom prst="rect">
-            <a:avLst/>
-          </a:prstGeom>
-        </p:spPr>
-      </p:pic>
     </p:spTree>
-    <p:extLst>
-      <p:ext uri="{BB962C8B-B14F-4D97-AF65-F5344CB8AC3E}">
-        <p14:creationId xmlns:p14="http://schemas.microsoft.com/office/powerpoint/2010/main" val="1474098577"/>
-      </p:ext>
-    </p:extLst>
   </p:cSld>
   <p:clrMapOvr>
     <a:masterClrMapping/>
   </p:clrMapOvr>
+  <p:transition/>
 </p:sld>
 </file>
 

</xml_diff>

<commit_message>
Updating method names and simplify
Remove trend from method name where not needed for namespacing
</commit_message>
<xml_diff>
--- a/samples/pptx/sample.pptx
+++ b/samples/pptx/sample.pptx
@@ -10,7 +10,6 @@
     <p:sldId id="258" r:id="rId8"/>
     <p:sldId id="259" r:id="rId9"/>
     <p:sldId id="260" r:id="rId10"/>
-    <p:sldId id="261" r:id="rId11"/>
   </p:sldIdLst>
   <p:sldSz cx="9144000" cy="6858000" type="screen4x3"/>
   <p:notesSz cx="6858000" cy="9144000"/>
@@ -16791,82 +16790,6 @@
 </file>
 
 <file path=ppt/slides/slide1.xml><?xml version="1.0" encoding="utf-8"?>
-<p:sld xmlns:a="http://schemas.openxmlformats.org/drawingml/2006/main" xmlns:p="http://schemas.openxmlformats.org/presentationml/2006/main" xmlns:r="http://schemas.openxmlformats.org/officeDocument/2006/relationships">
-  <p:cSld>
-    <p:spTree>
-      <p:nvGrpSpPr>
-        <p:cNvPr id="1" name=""/>
-        <p:cNvGrpSpPr/>
-        <p:nvPr/>
-      </p:nvGrpSpPr>
-      <p:grpSpPr>
-        <a:xfrm>
-          <a:off x="0" y="0"/>
-          <a:ext cx="0" cy="0"/>
-          <a:chOff x="0" y="0"/>
-          <a:chExt cx="0" cy="0"/>
-        </a:xfrm>
-      </p:grpSpPr>
-      <p:sp>
-        <p:nvSpPr>
-          <p:cNvPr id="2" name="Title 1"/>
-          <p:cNvSpPr>
-            <a:spLocks noGrp="1"/>
-          </p:cNvSpPr>
-          <p:nvPr>
-            <p:ph type="ctrTitle"/>
-          </p:nvPr>
-        </p:nvSpPr>
-        <p:spPr/>
-        <p:txBody>
-          <a:bodyPr/>
-          <a:lstStyle/>
-          <a:p>
-            <a:r>
-              <a:rPr dirty="0" lang="en-US" smtClean="0"/>
-              <a:t>Test Presentation</a:t>
-            </a:r>
-            <a:endParaRPr dirty="0" lang="en-US"/>
-          </a:p>
-        </p:txBody>
-      </p:sp>
-      <p:sp>
-        <p:nvSpPr>
-          <p:cNvPr id="3" name="Subtitle 2"/>
-          <p:cNvSpPr>
-            <a:spLocks noGrp="1"/>
-          </p:cNvSpPr>
-          <p:nvPr>
-            <p:ph idx="1" type="subTitle"/>
-          </p:nvPr>
-        </p:nvSpPr>
-        <p:spPr/>
-        <p:txBody>
-          <a:bodyPr/>
-          <a:lstStyle/>
-          <a:p>
-            <a:r>
-              <a:rPr lang="en-US" smtClean="0"/>
-              <a:t>created automagically</a:t>
-            </a:r>
-            <a:endParaRPr lang="en-US"/>
-          </a:p>
-        </p:txBody>
-      </p:sp>
-    </p:spTree>
-    <p:extLst>
-      <p:ext uri="{BB962C8B-B14F-4D97-AF65-F5344CB8AC3E}">
-        <p14:creationId xmlns:p14="http://schemas.microsoft.com/office/powerpoint/2010/main" val="1633108117"/>
-      </p:ext>
-    </p:extLst>
-  </p:cSld>
-  <p:clrMapOvr>
-    <a:masterClrMapping/>
-  </p:clrMapOvr>
-</p:sld>
-</file>
-
-<file path=ppt/slides/slide2.xml><?xml version="1.0" encoding="utf-8"?>
 <p:sld xmlns:a="http://schemas.openxmlformats.org/drawingml/2006/main" xmlns:r="http://schemas.openxmlformats.org/officeDocument/2006/relationships" xmlns:p="http://schemas.openxmlformats.org/presentationml/2006/main">
   <p:cSld>
     <p:spTree>
@@ -17395,7 +17318,7 @@
 </p:sld>
 </file>
 
-<file path=ppt/slides/slide3.xml><?xml version="1.0" encoding="utf-8"?>
+<file path=ppt/slides/slide2.xml><?xml version="1.0" encoding="utf-8"?>
 <p:sld xmlns:a="http://schemas.openxmlformats.org/drawingml/2006/main" xmlns:r="http://schemas.openxmlformats.org/officeDocument/2006/relationships" xmlns:p="http://schemas.openxmlformats.org/presentationml/2006/main">
   <p:cSld>
     <p:spTree>
@@ -19277,7 +19200,7 @@
 </p:sld>
 </file>
 
-<file path=ppt/slides/slide4.xml><?xml version="1.0" encoding="utf-8"?>
+<file path=ppt/slides/slide3.xml><?xml version="1.0" encoding="utf-8"?>
 <p:sld xmlns:a="http://schemas.openxmlformats.org/drawingml/2006/main" xmlns:r="http://schemas.openxmlformats.org/officeDocument/2006/relationships" xmlns:p="http://schemas.openxmlformats.org/presentationml/2006/main">
   <p:cSld>
     <p:spTree>
@@ -19453,7 +19376,7 @@
 </p:sld>
 </file>
 
-<file path=ppt/slides/slide5.xml><?xml version="1.0" encoding="utf-8"?>
+<file path=ppt/slides/slide4.xml><?xml version="1.0" encoding="utf-8"?>
 <p:sld xmlns:a="http://schemas.openxmlformats.org/drawingml/2006/main" xmlns:r="http://schemas.openxmlformats.org/officeDocument/2006/relationships" xmlns:p="http://schemas.openxmlformats.org/presentationml/2006/main">
   <p:cSld>
     <p:spTree>
@@ -19999,7 +19922,7 @@
 </p:sld>
 </file>
 
-<file path=ppt/slides/slide6.xml><?xml version="1.0" encoding="utf-8"?>
+<file path=ppt/slides/slide5.xml><?xml version="1.0" encoding="utf-8"?>
 <p:sld xmlns:a="http://schemas.openxmlformats.org/drawingml/2006/main" xmlns:r="http://schemas.openxmlformats.org/officeDocument/2006/relationships" xmlns:p="http://schemas.openxmlformats.org/presentationml/2006/main">
   <p:cSld>
     <p:spTree>
@@ -20043,6 +19966,7 @@
               <a:spcAft>
                 <a:spcPts val="600"/>
               </a:spcAft>
+              <a:buNone/>
             </a:pPr>
             <a:r>
               <a:rPr lang="en-GB" b="1" dirty="0" smtClean="0"/>
@@ -20069,6 +19993,7 @@
               <a:spcAft>
                 <a:spcPts val="600"/>
               </a:spcAft>
+              <a:buNone/>
             </a:pPr>
             <a:r>
               <a:rPr lang="en-GB" b="1" dirty="0" smtClean="0"/>

</xml_diff>